<commit_message>
feat: Create 10 unique sample templates with different designs
Each template now has distinct visual style:

1. Business Professional - Navy blue with side bar
2. Modern Dark - Dark theme with neon green accents
3. Minimalist - Clean white with subtle lines
4. Nature Green - Green circles, organic feel
5. Creative Purple - Bold purple split design
6. Sunset Orange - Warm tones with wave shapes
7. Ocean Blue - Blue waves, calm professional
8. Executive Gold - Gold accents, luxury borders
9. Startup Modern - Purple sidebar with coral circle
10. Healthcare Medical - Teal with medical cross

All templates have unique:
- Color schemes
- Shape layouts
- Design elements
- Visual personality
</commit_message>
<xml_diff>
--- a/backend/templates/24a8c405-aed9-4e1f-8ce7-365303f19ea2.pptx
+++ b/backend/templates/24a8c405-aed9-4e1f-8ce7-365303f19ea2.pptx
@@ -7,10 +7,6 @@
   <p:sldIdLst>
     <p:sldId id="256" r:id="rId7"/>
     <p:sldId id="257" r:id="rId8"/>
-    <p:sldId id="258" r:id="rId9"/>
-    <p:sldId id="259" r:id="rId10"/>
-    <p:sldId id="260" r:id="rId11"/>
-    <p:sldId id="261" r:id="rId12"/>
   </p:sldIdLst>
   <p:sldSz cx="12191695" cy="6858000" type="screen4x3"/>
   <p:notesSz cx="6858000" cy="9144000"/>
@@ -3145,13 +3141,13 @@
         <p:spPr>
           <a:xfrm>
             <a:off x="0" y="0"/>
-            <a:ext cx="12191695" cy="228600"/>
+            <a:ext cx="12191695" cy="137160"/>
           </a:xfrm>
           <a:prstGeom prst="rect">
             <a:avLst/>
           </a:prstGeom>
           <a:solidFill>
-            <a:srgbClr val="0096FF"/>
+            <a:srgbClr val="00FFC8"/>
           </a:solidFill>
           <a:ln>
             <a:noFill/>
@@ -3181,92 +3177,20 @@
       </p:sp>
       <p:sp>
         <p:nvSpPr>
-          <p:cNvPr id="4" name="TextBox 3"/>
-          <p:cNvSpPr txBox="1"/>
+          <p:cNvPr id="4" name="Oval 3"/>
+          <p:cNvSpPr/>
           <p:nvPr/>
         </p:nvSpPr>
         <p:spPr>
           <a:xfrm>
-            <a:off x="914400" y="2286000"/>
-            <a:ext cx="7315200" cy="1371600"/>
+            <a:off x="9144000" y="-1828800"/>
+            <a:ext cx="4572000" cy="4572000"/>
           </a:xfrm>
-          <a:prstGeom prst="rect">
-            <a:avLst/>
-          </a:prstGeom>
-          <a:noFill/>
-        </p:spPr>
-        <p:txBody>
-          <a:bodyPr wrap="square">
-            <a:spAutoFit/>
-          </a:bodyPr>
-          <a:lstStyle/>
-          <a:p>
-            <a:pPr algn="l">
-              <a:defRPr sz="4400" b="1">
-                <a:solidFill>
-                  <a:srgbClr val="FFFFFF"/>
-                </a:solidFill>
-                <a:latin typeface="Arial"/>
-              </a:defRPr>
-            </a:pPr>
-            <a:r>
-              <a:t>Modern Dark</a:t>
-            </a:r>
-          </a:p>
-        </p:txBody>
-      </p:sp>
-      <p:sp>
-        <p:nvSpPr>
-          <p:cNvPr id="5" name="TextBox 4"/>
-          <p:cNvSpPr txBox="1"/>
-          <p:nvPr/>
-        </p:nvSpPr>
-        <p:spPr>
-          <a:xfrm>
-            <a:off x="914400" y="3840480"/>
-            <a:ext cx="7315200" cy="914400"/>
-          </a:xfrm>
-          <a:prstGeom prst="rect">
-            <a:avLst/>
-          </a:prstGeom>
-          <a:noFill/>
-        </p:spPr>
-        <p:txBody>
-          <a:bodyPr wrap="square">
-            <a:spAutoFit/>
-          </a:bodyPr>
-          <a:lstStyle/>
-          <a:p>
-            <a:pPr algn="l">
-              <a:defRPr sz="2000" b="0">
-                <a:solidFill>
-                  <a:srgbClr val="C8C8C8"/>
-                </a:solidFill>
-                <a:latin typeface="Arial"/>
-              </a:defRPr>
-            </a:pPr>
-            <a:r>
-              <a:t>Professional Presentation Template</a:t>
-            </a:r>
-          </a:p>
-        </p:txBody>
-      </p:sp>
-      <p:sp>
-        <p:nvSpPr>
-          <p:cNvPr id="6" name="Rectangle 5"/>
-          <p:cNvSpPr/>
-          <p:nvPr/>
-        </p:nvSpPr>
-        <p:spPr>
-          <a:xfrm>
-            <a:off x="914400" y="3657600"/>
-            <a:ext cx="1828800" cy="45720"/>
-          </a:xfrm>
-          <a:prstGeom prst="rect">
+          <a:prstGeom prst="ellipse">
             <a:avLst/>
           </a:prstGeom>
           <a:solidFill>
-            <a:srgbClr val="0096FF"/>
+            <a:srgbClr val="00FFC8"/>
           </a:solidFill>
           <a:ln>
             <a:noFill/>
@@ -3294,6 +3218,78 @@
           </a:p>
         </p:txBody>
       </p:sp>
+      <p:sp>
+        <p:nvSpPr>
+          <p:cNvPr id="5" name="TextBox 4"/>
+          <p:cNvSpPr txBox="1"/>
+          <p:nvPr/>
+        </p:nvSpPr>
+        <p:spPr>
+          <a:xfrm>
+            <a:off x="914400" y="2286000"/>
+            <a:ext cx="9144000" cy="1371600"/>
+          </a:xfrm>
+          <a:prstGeom prst="rect">
+            <a:avLst/>
+          </a:prstGeom>
+          <a:noFill/>
+        </p:spPr>
+        <p:txBody>
+          <a:bodyPr wrap="square">
+            <a:spAutoFit/>
+          </a:bodyPr>
+          <a:lstStyle/>
+          <a:p>
+            <a:pPr>
+              <a:defRPr sz="4800" b="1">
+                <a:solidFill>
+                  <a:srgbClr val="FFFFFF"/>
+                </a:solidFill>
+                <a:latin typeface="Calibri"/>
+              </a:defRPr>
+            </a:pPr>
+            <a:r>
+              <a:t>Modern Dark</a:t>
+            </a:r>
+          </a:p>
+        </p:txBody>
+      </p:sp>
+      <p:sp>
+        <p:nvSpPr>
+          <p:cNvPr id="6" name="TextBox 5"/>
+          <p:cNvSpPr txBox="1"/>
+          <p:nvPr/>
+        </p:nvSpPr>
+        <p:spPr>
+          <a:xfrm>
+            <a:off x="914400" y="3840480"/>
+            <a:ext cx="9144000" cy="914400"/>
+          </a:xfrm>
+          <a:prstGeom prst="rect">
+            <a:avLst/>
+          </a:prstGeom>
+          <a:noFill/>
+        </p:spPr>
+        <p:txBody>
+          <a:bodyPr wrap="square">
+            <a:spAutoFit/>
+          </a:bodyPr>
+          <a:lstStyle/>
+          <a:p>
+            <a:pPr>
+              <a:defRPr sz="2000" b="0">
+                <a:solidFill>
+                  <a:srgbClr val="B4B4B4"/>
+                </a:solidFill>
+                <a:latin typeface="Calibri"/>
+              </a:defRPr>
+            </a:pPr>
+            <a:r>
+              <a:t>Tech Presentation Template</a:t>
+            </a:r>
+          </a:p>
+        </p:txBody>
+      </p:sp>
     </p:spTree>
   </p:cSld>
   <p:clrMapOvr>
@@ -3327,7 +3323,7 @@
             <a:avLst/>
           </a:prstGeom>
           <a:solidFill>
-            <a:srgbClr val="1E1E23"/>
+            <a:srgbClr val="28282D"/>
           </a:solidFill>
           <a:ln>
             <a:noFill/>
@@ -3406,7 +3402,7 @@
         </p:nvSpPr>
         <p:spPr>
           <a:xfrm>
-            <a:off x="457200" y="274320"/>
+            <a:off x="457200" y="228600"/>
             <a:ext cx="10972800" cy="731520"/>
           </a:xfrm>
           <a:prstGeom prst="rect">
@@ -3423,13 +3419,13 @@
             <a:pPr>
               <a:defRPr sz="3200" b="1">
                 <a:solidFill>
-                  <a:srgbClr val="FFFFFF"/>
+                  <a:srgbClr val="00FFC8"/>
                 </a:solidFill>
-                <a:latin typeface="Arial"/>
+                <a:latin typeface="Calibri"/>
               </a:defRPr>
             </a:pPr>
             <a:r>
-              <a:t>Key Features</a:t>
+              <a:t>Features</a:t>
             </a:r>
           </a:p>
         </p:txBody>
@@ -3449,7 +3445,7 @@
             <a:avLst/>
           </a:prstGeom>
           <a:solidFill>
-            <a:srgbClr val="28282D"/>
+            <a:srgbClr val="323237"/>
           </a:solidFill>
           <a:ln>
             <a:noFill/>
@@ -3500,1022 +3496,31 @@
           <a:lstStyle/>
           <a:p>
             <a:pPr>
-              <a:defRPr sz="1800" b="0">
+              <a:defRPr sz="2000" b="0">
                 <a:solidFill>
                   <a:srgbClr val="C8C8C8"/>
                 </a:solidFill>
-                <a:latin typeface="Arial"/>
+                <a:latin typeface="Calibri"/>
               </a:defRPr>
             </a:pPr>
             <a:r>
-              <a:t>• Modern and clean design aesthetic</a:t>
+              <a:t>• Dark theme with neon accents</a:t>
             </a:r>
             <a:br/>
             <a:r>
-              <a:t>• Fully customizable color schemes</a:t>
+              <a:t>• Modern tech aesthetic</a:t>
             </a:r>
             <a:br/>
             <a:r>
-              <a:t>• Professional typography and layouts</a:t>
+              <a:t>• Perfect for startups</a:t>
             </a:r>
             <a:br/>
             <a:r>
-              <a:t>• Ready for business presentations</a:t>
+              <a:t>• Eye-catching design</a:t>
             </a:r>
             <a:br/>
             <a:r>
-              <a:t>• Easy to edit and adapt</a:t>
-            </a:r>
-          </a:p>
-        </p:txBody>
-      </p:sp>
-    </p:spTree>
-  </p:cSld>
-  <p:clrMapOvr>
-    <a:masterClrMapping/>
-  </p:clrMapOvr>
-</p:sld>
-</file>
-
-<file path=ppt/slides/slide3.xml><?xml version="1.0" encoding="utf-8"?>
-<p:sld xmlns:a="http://schemas.openxmlformats.org/drawingml/2006/main" xmlns:p="http://schemas.openxmlformats.org/presentationml/2006/main" xmlns:r="http://schemas.openxmlformats.org/officeDocument/2006/relationships">
-  <p:cSld>
-    <p:spTree>
-      <p:nvGrpSpPr>
-        <p:cNvPr id="1" name=""/>
-        <p:cNvGrpSpPr/>
-        <p:nvPr/>
-      </p:nvGrpSpPr>
-      <p:grpSpPr/>
-      <p:sp>
-        <p:nvSpPr>
-          <p:cNvPr id="2" name="Rectangle 1"/>
-          <p:cNvSpPr/>
-          <p:nvPr/>
-        </p:nvSpPr>
-        <p:spPr>
-          <a:xfrm>
-            <a:off x="0" y="0"/>
-            <a:ext cx="12191695" cy="6858000"/>
-          </a:xfrm>
-          <a:prstGeom prst="rect">
-            <a:avLst/>
-          </a:prstGeom>
-          <a:solidFill>
-            <a:srgbClr val="1E1E23"/>
-          </a:solidFill>
-          <a:ln>
-            <a:noFill/>
-          </a:ln>
-        </p:spPr>
-        <p:style>
-          <a:lnRef idx="1">
-            <a:schemeClr val="accent1"/>
-          </a:lnRef>
-          <a:fillRef idx="3">
-            <a:schemeClr val="accent1"/>
-          </a:fillRef>
-          <a:effectRef idx="2">
-            <a:schemeClr val="accent1"/>
-          </a:effectRef>
-          <a:fontRef idx="minor">
-            <a:schemeClr val="lt1"/>
-          </a:fontRef>
-        </p:style>
-        <p:txBody>
-          <a:bodyPr rtlCol="0" anchor="ctr"/>
-          <a:lstStyle/>
-          <a:p>
-            <a:pPr algn="ctr"/>
-          </a:p>
-        </p:txBody>
-      </p:sp>
-      <p:sp>
-        <p:nvSpPr>
-          <p:cNvPr id="3" name="Rectangle 2"/>
-          <p:cNvSpPr/>
-          <p:nvPr/>
-        </p:nvSpPr>
-        <p:spPr>
-          <a:xfrm>
-            <a:off x="0" y="0"/>
-            <a:ext cx="12191695" cy="914400"/>
-          </a:xfrm>
-          <a:prstGeom prst="rect">
-            <a:avLst/>
-          </a:prstGeom>
-          <a:solidFill>
-            <a:srgbClr val="2D2D32"/>
-          </a:solidFill>
-          <a:ln>
-            <a:noFill/>
-          </a:ln>
-        </p:spPr>
-        <p:style>
-          <a:lnRef idx="1">
-            <a:schemeClr val="accent1"/>
-          </a:lnRef>
-          <a:fillRef idx="3">
-            <a:schemeClr val="accent1"/>
-          </a:fillRef>
-          <a:effectRef idx="2">
-            <a:schemeClr val="accent1"/>
-          </a:effectRef>
-          <a:fontRef idx="minor">
-            <a:schemeClr val="lt1"/>
-          </a:fontRef>
-        </p:style>
-        <p:txBody>
-          <a:bodyPr rtlCol="0" anchor="ctr"/>
-          <a:lstStyle/>
-          <a:p>
-            <a:pPr algn="ctr"/>
-          </a:p>
-        </p:txBody>
-      </p:sp>
-      <p:sp>
-        <p:nvSpPr>
-          <p:cNvPr id="4" name="TextBox 3"/>
-          <p:cNvSpPr txBox="1"/>
-          <p:nvPr/>
-        </p:nvSpPr>
-        <p:spPr>
-          <a:xfrm>
-            <a:off x="457200" y="228600"/>
-            <a:ext cx="10972800" cy="548640"/>
-          </a:xfrm>
-          <a:prstGeom prst="rect">
-            <a:avLst/>
-          </a:prstGeom>
-          <a:noFill/>
-        </p:spPr>
-        <p:txBody>
-          <a:bodyPr wrap="square">
-            <a:spAutoFit/>
-          </a:bodyPr>
-          <a:lstStyle/>
-          <a:p>
-            <a:pPr>
-              <a:defRPr sz="2800" b="1">
-                <a:solidFill>
-                  <a:srgbClr val="FFFFFF"/>
-                </a:solidFill>
-                <a:latin typeface="Arial"/>
-              </a:defRPr>
-            </a:pPr>
-            <a:r>
-              <a:t>Comparison</a:t>
-            </a:r>
-          </a:p>
-        </p:txBody>
-      </p:sp>
-      <p:sp>
-        <p:nvSpPr>
-          <p:cNvPr id="5" name="Rounded Rectangle 4"/>
-          <p:cNvSpPr/>
-          <p:nvPr/>
-        </p:nvSpPr>
-        <p:spPr>
-          <a:xfrm>
-            <a:off x="457200" y="1188720"/>
-            <a:ext cx="5486400" cy="5212080"/>
-          </a:xfrm>
-          <a:prstGeom prst="roundRect">
-            <a:avLst/>
-          </a:prstGeom>
-          <a:solidFill>
-            <a:srgbClr val="28282D"/>
-          </a:solidFill>
-          <a:ln>
-            <a:noFill/>
-          </a:ln>
-        </p:spPr>
-        <p:style>
-          <a:lnRef idx="1">
-            <a:schemeClr val="accent1"/>
-          </a:lnRef>
-          <a:fillRef idx="3">
-            <a:schemeClr val="accent1"/>
-          </a:fillRef>
-          <a:effectRef idx="2">
-            <a:schemeClr val="accent1"/>
-          </a:effectRef>
-          <a:fontRef idx="minor">
-            <a:schemeClr val="lt1"/>
-          </a:fontRef>
-        </p:style>
-        <p:txBody>
-          <a:bodyPr rtlCol="0" anchor="ctr"/>
-          <a:lstStyle/>
-          <a:p>
-            <a:pPr algn="ctr"/>
-          </a:p>
-        </p:txBody>
-      </p:sp>
-      <p:sp>
-        <p:nvSpPr>
-          <p:cNvPr id="6" name="Rounded Rectangle 5"/>
-          <p:cNvSpPr/>
-          <p:nvPr/>
-        </p:nvSpPr>
-        <p:spPr>
-          <a:xfrm>
-            <a:off x="6217920" y="1188720"/>
-            <a:ext cx="5486400" cy="5212080"/>
-          </a:xfrm>
-          <a:prstGeom prst="roundRect">
-            <a:avLst/>
-          </a:prstGeom>
-          <a:solidFill>
-            <a:srgbClr val="28282D"/>
-          </a:solidFill>
-          <a:ln>
-            <a:noFill/>
-          </a:ln>
-        </p:spPr>
-        <p:style>
-          <a:lnRef idx="1">
-            <a:schemeClr val="accent1"/>
-          </a:lnRef>
-          <a:fillRef idx="3">
-            <a:schemeClr val="accent1"/>
-          </a:fillRef>
-          <a:effectRef idx="2">
-            <a:schemeClr val="accent1"/>
-          </a:effectRef>
-          <a:fontRef idx="minor">
-            <a:schemeClr val="lt1"/>
-          </a:fontRef>
-        </p:style>
-        <p:txBody>
-          <a:bodyPr rtlCol="0" anchor="ctr"/>
-          <a:lstStyle/>
-          <a:p>
-            <a:pPr algn="ctr"/>
-          </a:p>
-        </p:txBody>
-      </p:sp>
-      <p:sp>
-        <p:nvSpPr>
-          <p:cNvPr id="7" name="TextBox 6"/>
-          <p:cNvSpPr txBox="1"/>
-          <p:nvPr/>
-        </p:nvSpPr>
-        <p:spPr>
-          <a:xfrm>
-            <a:off x="731520" y="1463040"/>
-            <a:ext cx="4937760" cy="4572000"/>
-          </a:xfrm>
-          <a:prstGeom prst="rect">
-            <a:avLst/>
-          </a:prstGeom>
-          <a:noFill/>
-        </p:spPr>
-        <p:txBody>
-          <a:bodyPr wrap="square">
-            <a:spAutoFit/>
-          </a:bodyPr>
-          <a:lstStyle/>
-          <a:p>
-            <a:pPr>
-              <a:defRPr sz="1600" b="0">
-                <a:solidFill>
-                  <a:srgbClr val="C8C8C8"/>
-                </a:solidFill>
-                <a:latin typeface="Arial"/>
-              </a:defRPr>
-            </a:pPr>
-            <a:r>
-              <a:t>• Point A details here</a:t>
-            </a:r>
-            <a:br/>
-            <a:r>
-              <a:t>• Supporting information</a:t>
-            </a:r>
-            <a:br/>
-            <a:r>
-              <a:t>• Additional context</a:t>
-            </a:r>
-            <a:br/>
-            <a:r>
-              <a:t>• Key takeaway</a:t>
-            </a:r>
-          </a:p>
-        </p:txBody>
-      </p:sp>
-      <p:sp>
-        <p:nvSpPr>
-          <p:cNvPr id="8" name="TextBox 7"/>
-          <p:cNvSpPr txBox="1"/>
-          <p:nvPr/>
-        </p:nvSpPr>
-        <p:spPr>
-          <a:xfrm>
-            <a:off x="6492240" y="1463040"/>
-            <a:ext cx="4937760" cy="4572000"/>
-          </a:xfrm>
-          <a:prstGeom prst="rect">
-            <a:avLst/>
-          </a:prstGeom>
-          <a:noFill/>
-        </p:spPr>
-        <p:txBody>
-          <a:bodyPr wrap="square">
-            <a:spAutoFit/>
-          </a:bodyPr>
-          <a:lstStyle/>
-          <a:p>
-            <a:pPr>
-              <a:defRPr sz="1600" b="0">
-                <a:solidFill>
-                  <a:srgbClr val="C8C8C8"/>
-                </a:solidFill>
-                <a:latin typeface="Arial"/>
-              </a:defRPr>
-            </a:pPr>
-            <a:r>
-              <a:t>• Point B details here</a:t>
-            </a:r>
-            <a:br/>
-            <a:r>
-              <a:t>• Supporting information</a:t>
-            </a:r>
-            <a:br/>
-            <a:r>
-              <a:t>• Additional context</a:t>
-            </a:r>
-            <a:br/>
-            <a:r>
-              <a:t>• Key takeaway</a:t>
-            </a:r>
-          </a:p>
-        </p:txBody>
-      </p:sp>
-    </p:spTree>
-  </p:cSld>
-  <p:clrMapOvr>
-    <a:masterClrMapping/>
-  </p:clrMapOvr>
-</p:sld>
-</file>
-
-<file path=ppt/slides/slide4.xml><?xml version="1.0" encoding="utf-8"?>
-<p:sld xmlns:a="http://schemas.openxmlformats.org/drawingml/2006/main" xmlns:p="http://schemas.openxmlformats.org/presentationml/2006/main" xmlns:r="http://schemas.openxmlformats.org/officeDocument/2006/relationships">
-  <p:cSld>
-    <p:spTree>
-      <p:nvGrpSpPr>
-        <p:cNvPr id="1" name=""/>
-        <p:cNvGrpSpPr/>
-        <p:nvPr/>
-      </p:nvGrpSpPr>
-      <p:grpSpPr/>
-      <p:sp>
-        <p:nvSpPr>
-          <p:cNvPr id="2" name="Rectangle 1"/>
-          <p:cNvSpPr/>
-          <p:nvPr/>
-        </p:nvSpPr>
-        <p:spPr>
-          <a:xfrm>
-            <a:off x="0" y="0"/>
-            <a:ext cx="12191695" cy="6858000"/>
-          </a:xfrm>
-          <a:prstGeom prst="rect">
-            <a:avLst/>
-          </a:prstGeom>
-          <a:solidFill>
-            <a:srgbClr val="0096FF"/>
-          </a:solidFill>
-          <a:ln>
-            <a:noFill/>
-          </a:ln>
-        </p:spPr>
-        <p:style>
-          <a:lnRef idx="1">
-            <a:schemeClr val="accent1"/>
-          </a:lnRef>
-          <a:fillRef idx="3">
-            <a:schemeClr val="accent1"/>
-          </a:fillRef>
-          <a:effectRef idx="2">
-            <a:schemeClr val="accent1"/>
-          </a:effectRef>
-          <a:fontRef idx="minor">
-            <a:schemeClr val="lt1"/>
-          </a:fontRef>
-        </p:style>
-        <p:txBody>
-          <a:bodyPr rtlCol="0" anchor="ctr"/>
-          <a:lstStyle/>
-          <a:p>
-            <a:pPr algn="ctr"/>
-          </a:p>
-        </p:txBody>
-      </p:sp>
-      <p:sp>
-        <p:nvSpPr>
-          <p:cNvPr id="3" name="Rectangle 2"/>
-          <p:cNvSpPr/>
-          <p:nvPr/>
-        </p:nvSpPr>
-        <p:spPr>
-          <a:xfrm>
-            <a:off x="1828800" y="2286000"/>
-            <a:ext cx="8534095" cy="2286000"/>
-          </a:xfrm>
-          <a:prstGeom prst="rect">
-            <a:avLst/>
-          </a:prstGeom>
-          <a:solidFill>
-            <a:srgbClr val="1E1E23"/>
-          </a:solidFill>
-          <a:ln>
-            <a:noFill/>
-          </a:ln>
-        </p:spPr>
-        <p:style>
-          <a:lnRef idx="1">
-            <a:schemeClr val="accent1"/>
-          </a:lnRef>
-          <a:fillRef idx="3">
-            <a:schemeClr val="accent1"/>
-          </a:fillRef>
-          <a:effectRef idx="2">
-            <a:schemeClr val="accent1"/>
-          </a:effectRef>
-          <a:fontRef idx="minor">
-            <a:schemeClr val="lt1"/>
-          </a:fontRef>
-        </p:style>
-        <p:txBody>
-          <a:bodyPr rtlCol="0" anchor="ctr"/>
-          <a:lstStyle/>
-          <a:p>
-            <a:pPr algn="ctr"/>
-          </a:p>
-        </p:txBody>
-      </p:sp>
-      <p:sp>
-        <p:nvSpPr>
-          <p:cNvPr id="4" name="TextBox 3"/>
-          <p:cNvSpPr txBox="1"/>
-          <p:nvPr/>
-        </p:nvSpPr>
-        <p:spPr>
-          <a:xfrm>
-            <a:off x="2286000" y="2926080"/>
-            <a:ext cx="7619695" cy="1097280"/>
-          </a:xfrm>
-          <a:prstGeom prst="rect">
-            <a:avLst/>
-          </a:prstGeom>
-          <a:noFill/>
-        </p:spPr>
-        <p:txBody>
-          <a:bodyPr wrap="square">
-            <a:spAutoFit/>
-          </a:bodyPr>
-          <a:lstStyle/>
-          <a:p>
-            <a:pPr algn="ctr">
-              <a:defRPr sz="3600" b="1">
-                <a:solidFill>
-                  <a:srgbClr val="FFFFFF"/>
-                </a:solidFill>
-                <a:latin typeface="Arial"/>
-              </a:defRPr>
-            </a:pPr>
-            <a:r>
-              <a:t>New Section</a:t>
-            </a:r>
-          </a:p>
-        </p:txBody>
-      </p:sp>
-    </p:spTree>
-  </p:cSld>
-  <p:clrMapOvr>
-    <a:masterClrMapping/>
-  </p:clrMapOvr>
-</p:sld>
-</file>
-
-<file path=ppt/slides/slide5.xml><?xml version="1.0" encoding="utf-8"?>
-<p:sld xmlns:a="http://schemas.openxmlformats.org/drawingml/2006/main" xmlns:p="http://schemas.openxmlformats.org/presentationml/2006/main" xmlns:r="http://schemas.openxmlformats.org/officeDocument/2006/relationships">
-  <p:cSld>
-    <p:spTree>
-      <p:nvGrpSpPr>
-        <p:cNvPr id="1" name=""/>
-        <p:cNvGrpSpPr/>
-        <p:nvPr/>
-      </p:nvGrpSpPr>
-      <p:grpSpPr/>
-      <p:sp>
-        <p:nvSpPr>
-          <p:cNvPr id="2" name="Rectangle 1"/>
-          <p:cNvSpPr/>
-          <p:nvPr/>
-        </p:nvSpPr>
-        <p:spPr>
-          <a:xfrm>
-            <a:off x="0" y="0"/>
-            <a:ext cx="12191695" cy="6858000"/>
-          </a:xfrm>
-          <a:prstGeom prst="rect">
-            <a:avLst/>
-          </a:prstGeom>
-          <a:solidFill>
-            <a:srgbClr val="1E1E23"/>
-          </a:solidFill>
-          <a:ln>
-            <a:noFill/>
-          </a:ln>
-        </p:spPr>
-        <p:style>
-          <a:lnRef idx="1">
-            <a:schemeClr val="accent1"/>
-          </a:lnRef>
-          <a:fillRef idx="3">
-            <a:schemeClr val="accent1"/>
-          </a:fillRef>
-          <a:effectRef idx="2">
-            <a:schemeClr val="accent1"/>
-          </a:effectRef>
-          <a:fontRef idx="minor">
-            <a:schemeClr val="lt1"/>
-          </a:fontRef>
-        </p:style>
-        <p:txBody>
-          <a:bodyPr rtlCol="0" anchor="ctr"/>
-          <a:lstStyle/>
-          <a:p>
-            <a:pPr algn="ctr"/>
-          </a:p>
-        </p:txBody>
-      </p:sp>
-      <p:sp>
-        <p:nvSpPr>
-          <p:cNvPr id="3" name="Rectangle 2"/>
-          <p:cNvSpPr/>
-          <p:nvPr/>
-        </p:nvSpPr>
-        <p:spPr>
-          <a:xfrm>
-            <a:off x="0" y="0"/>
-            <a:ext cx="12191695" cy="914400"/>
-          </a:xfrm>
-          <a:prstGeom prst="rect">
-            <a:avLst/>
-          </a:prstGeom>
-          <a:solidFill>
-            <a:srgbClr val="2D2D32"/>
-          </a:solidFill>
-          <a:ln>
-            <a:noFill/>
-          </a:ln>
-        </p:spPr>
-        <p:style>
-          <a:lnRef idx="1">
-            <a:schemeClr val="accent1"/>
-          </a:lnRef>
-          <a:fillRef idx="3">
-            <a:schemeClr val="accent1"/>
-          </a:fillRef>
-          <a:effectRef idx="2">
-            <a:schemeClr val="accent1"/>
-          </a:effectRef>
-          <a:fontRef idx="minor">
-            <a:schemeClr val="lt1"/>
-          </a:fontRef>
-        </p:style>
-        <p:txBody>
-          <a:bodyPr rtlCol="0" anchor="ctr"/>
-          <a:lstStyle/>
-          <a:p>
-            <a:pPr algn="ctr"/>
-          </a:p>
-        </p:txBody>
-      </p:sp>
-      <p:sp>
-        <p:nvSpPr>
-          <p:cNvPr id="4" name="TextBox 3"/>
-          <p:cNvSpPr txBox="1"/>
-          <p:nvPr/>
-        </p:nvSpPr>
-        <p:spPr>
-          <a:xfrm>
-            <a:off x="457200" y="228600"/>
-            <a:ext cx="10972800" cy="548640"/>
-          </a:xfrm>
-          <a:prstGeom prst="rect">
-            <a:avLst/>
-          </a:prstGeom>
-          <a:noFill/>
-        </p:spPr>
-        <p:txBody>
-          <a:bodyPr wrap="square">
-            <a:spAutoFit/>
-          </a:bodyPr>
-          <a:lstStyle/>
-          <a:p>
-            <a:pPr>
-              <a:defRPr sz="2800" b="1">
-                <a:solidFill>
-                  <a:srgbClr val="FFFFFF"/>
-                </a:solidFill>
-                <a:latin typeface="Arial"/>
-              </a:defRPr>
-            </a:pPr>
-            <a:r>
-              <a:t>Visual Content</a:t>
-            </a:r>
-          </a:p>
-        </p:txBody>
-      </p:sp>
-      <p:sp>
-        <p:nvSpPr>
-          <p:cNvPr id="5" name="Rounded Rectangle 4"/>
-          <p:cNvSpPr/>
-          <p:nvPr/>
-        </p:nvSpPr>
-        <p:spPr>
-          <a:xfrm>
-            <a:off x="457200" y="1188720"/>
-            <a:ext cx="5486400" cy="5212080"/>
-          </a:xfrm>
-          <a:prstGeom prst="roundRect">
-            <a:avLst/>
-          </a:prstGeom>
-          <a:solidFill>
-            <a:srgbClr val="DCDCDC"/>
-          </a:solidFill>
-          <a:ln>
-            <a:noFill/>
-          </a:ln>
-        </p:spPr>
-        <p:style>
-          <a:lnRef idx="1">
-            <a:schemeClr val="accent1"/>
-          </a:lnRef>
-          <a:fillRef idx="3">
-            <a:schemeClr val="accent1"/>
-          </a:fillRef>
-          <a:effectRef idx="2">
-            <a:schemeClr val="accent1"/>
-          </a:effectRef>
-          <a:fontRef idx="minor">
-            <a:schemeClr val="lt1"/>
-          </a:fontRef>
-        </p:style>
-        <p:txBody>
-          <a:bodyPr rtlCol="0" anchor="ctr"/>
-          <a:lstStyle/>
-          <a:p>
-            <a:pPr algn="ctr"/>
-          </a:p>
-        </p:txBody>
-      </p:sp>
-      <p:sp>
-        <p:nvSpPr>
-          <p:cNvPr id="6" name="TextBox 5"/>
-          <p:cNvSpPr txBox="1"/>
-          <p:nvPr/>
-        </p:nvSpPr>
-        <p:spPr>
-          <a:xfrm>
-            <a:off x="457200" y="3200400"/>
-            <a:ext cx="5486400" cy="914400"/>
-          </a:xfrm>
-          <a:prstGeom prst="rect">
-            <a:avLst/>
-          </a:prstGeom>
-          <a:noFill/>
-        </p:spPr>
-        <p:txBody>
-          <a:bodyPr wrap="square">
-            <a:spAutoFit/>
-          </a:bodyPr>
-          <a:lstStyle/>
-          <a:p>
-            <a:pPr algn="ctr">
-              <a:defRPr sz="2400" b="0">
-                <a:solidFill>
-                  <a:srgbClr val="969696"/>
-                </a:solidFill>
-                <a:latin typeface="Arial"/>
-              </a:defRPr>
-            </a:pPr>
-            <a:r>
-              <a:t>🖼️ Image</a:t>
-            </a:r>
-          </a:p>
-        </p:txBody>
-      </p:sp>
-      <p:sp>
-        <p:nvSpPr>
-          <p:cNvPr id="7" name="Rounded Rectangle 6"/>
-          <p:cNvSpPr/>
-          <p:nvPr/>
-        </p:nvSpPr>
-        <p:spPr>
-          <a:xfrm>
-            <a:off x="6217920" y="1188720"/>
-            <a:ext cx="5486400" cy="5212080"/>
-          </a:xfrm>
-          <a:prstGeom prst="roundRect">
-            <a:avLst/>
-          </a:prstGeom>
-          <a:solidFill>
-            <a:srgbClr val="28282D"/>
-          </a:solidFill>
-          <a:ln>
-            <a:noFill/>
-          </a:ln>
-        </p:spPr>
-        <p:style>
-          <a:lnRef idx="1">
-            <a:schemeClr val="accent1"/>
-          </a:lnRef>
-          <a:fillRef idx="3">
-            <a:schemeClr val="accent1"/>
-          </a:fillRef>
-          <a:effectRef idx="2">
-            <a:schemeClr val="accent1"/>
-          </a:effectRef>
-          <a:fontRef idx="minor">
-            <a:schemeClr val="lt1"/>
-          </a:fontRef>
-        </p:style>
-        <p:txBody>
-          <a:bodyPr rtlCol="0" anchor="ctr"/>
-          <a:lstStyle/>
-          <a:p>
-            <a:pPr algn="ctr"/>
-          </a:p>
-        </p:txBody>
-      </p:sp>
-      <p:sp>
-        <p:nvSpPr>
-          <p:cNvPr id="8" name="TextBox 7"/>
-          <p:cNvSpPr txBox="1"/>
-          <p:nvPr/>
-        </p:nvSpPr>
-        <p:spPr>
-          <a:xfrm>
-            <a:off x="6492240" y="1463040"/>
-            <a:ext cx="4937760" cy="4572000"/>
-          </a:xfrm>
-          <a:prstGeom prst="rect">
-            <a:avLst/>
-          </a:prstGeom>
-          <a:noFill/>
-        </p:spPr>
-        <p:txBody>
-          <a:bodyPr wrap="square">
-            <a:spAutoFit/>
-          </a:bodyPr>
-          <a:lstStyle/>
-          <a:p>
-            <a:pPr>
-              <a:defRPr sz="1600" b="0">
-                <a:solidFill>
-                  <a:srgbClr val="C8C8C8"/>
-                </a:solidFill>
-                <a:latin typeface="Arial"/>
-              </a:defRPr>
-            </a:pPr>
-            <a:r>
-              <a:t>Add your image to the left placeholder and describe it here. This layout is perfect for showcasing products, diagrams, or visual data.</a:t>
-            </a:r>
-          </a:p>
-        </p:txBody>
-      </p:sp>
-    </p:spTree>
-  </p:cSld>
-  <p:clrMapOvr>
-    <a:masterClrMapping/>
-  </p:clrMapOvr>
-</p:sld>
-</file>
-
-<file path=ppt/slides/slide6.xml><?xml version="1.0" encoding="utf-8"?>
-<p:sld xmlns:a="http://schemas.openxmlformats.org/drawingml/2006/main" xmlns:p="http://schemas.openxmlformats.org/presentationml/2006/main" xmlns:r="http://schemas.openxmlformats.org/officeDocument/2006/relationships">
-  <p:cSld>
-    <p:spTree>
-      <p:nvGrpSpPr>
-        <p:cNvPr id="1" name=""/>
-        <p:cNvGrpSpPr/>
-        <p:nvPr/>
-      </p:nvGrpSpPr>
-      <p:grpSpPr/>
-      <p:sp>
-        <p:nvSpPr>
-          <p:cNvPr id="2" name="Rectangle 1"/>
-          <p:cNvSpPr/>
-          <p:nvPr/>
-        </p:nvSpPr>
-        <p:spPr>
-          <a:xfrm>
-            <a:off x="0" y="0"/>
-            <a:ext cx="12191695" cy="6858000"/>
-          </a:xfrm>
-          <a:prstGeom prst="rect">
-            <a:avLst/>
-          </a:prstGeom>
-          <a:solidFill>
-            <a:srgbClr val="1E1E23"/>
-          </a:solidFill>
-          <a:ln>
-            <a:noFill/>
-          </a:ln>
-        </p:spPr>
-        <p:style>
-          <a:lnRef idx="1">
-            <a:schemeClr val="accent1"/>
-          </a:lnRef>
-          <a:fillRef idx="3">
-            <a:schemeClr val="accent1"/>
-          </a:fillRef>
-          <a:effectRef idx="2">
-            <a:schemeClr val="accent1"/>
-          </a:effectRef>
-          <a:fontRef idx="minor">
-            <a:schemeClr val="lt1"/>
-          </a:fontRef>
-        </p:style>
-        <p:txBody>
-          <a:bodyPr rtlCol="0" anchor="ctr"/>
-          <a:lstStyle/>
-          <a:p>
-            <a:pPr algn="ctr"/>
-          </a:p>
-        </p:txBody>
-      </p:sp>
-      <p:sp>
-        <p:nvSpPr>
-          <p:cNvPr id="3" name="Rectangle 2"/>
-          <p:cNvSpPr/>
-          <p:nvPr/>
-        </p:nvSpPr>
-        <p:spPr>
-          <a:xfrm>
-            <a:off x="0" y="0"/>
-            <a:ext cx="12191695" cy="1097280"/>
-          </a:xfrm>
-          <a:prstGeom prst="rect">
-            <a:avLst/>
-          </a:prstGeom>
-          <a:solidFill>
-            <a:srgbClr val="2D2D32"/>
-          </a:solidFill>
-          <a:ln>
-            <a:noFill/>
-          </a:ln>
-        </p:spPr>
-        <p:style>
-          <a:lnRef idx="1">
-            <a:schemeClr val="accent1"/>
-          </a:lnRef>
-          <a:fillRef idx="3">
-            <a:schemeClr val="accent1"/>
-          </a:fillRef>
-          <a:effectRef idx="2">
-            <a:schemeClr val="accent1"/>
-          </a:effectRef>
-          <a:fontRef idx="minor">
-            <a:schemeClr val="lt1"/>
-          </a:fontRef>
-        </p:style>
-        <p:txBody>
-          <a:bodyPr rtlCol="0" anchor="ctr"/>
-          <a:lstStyle/>
-          <a:p>
-            <a:pPr algn="ctr"/>
-          </a:p>
-        </p:txBody>
-      </p:sp>
-      <p:sp>
-        <p:nvSpPr>
-          <p:cNvPr id="4" name="TextBox 3"/>
-          <p:cNvSpPr txBox="1"/>
-          <p:nvPr/>
-        </p:nvSpPr>
-        <p:spPr>
-          <a:xfrm>
-            <a:off x="457200" y="274320"/>
-            <a:ext cx="10972800" cy="731520"/>
-          </a:xfrm>
-          <a:prstGeom prst="rect">
-            <a:avLst/>
-          </a:prstGeom>
-          <a:noFill/>
-        </p:spPr>
-        <p:txBody>
-          <a:bodyPr wrap="square">
-            <a:spAutoFit/>
-          </a:bodyPr>
-          <a:lstStyle/>
-          <a:p>
-            <a:pPr>
-              <a:defRPr sz="3200" b="1">
-                <a:solidFill>
-                  <a:srgbClr val="FFFFFF"/>
-                </a:solidFill>
-                <a:latin typeface="Arial"/>
-              </a:defRPr>
-            </a:pPr>
-            <a:r>
-              <a:t>Summary</a:t>
-            </a:r>
-          </a:p>
-        </p:txBody>
-      </p:sp>
-      <p:sp>
-        <p:nvSpPr>
-          <p:cNvPr id="5" name="Rounded Rectangle 4"/>
-          <p:cNvSpPr/>
-          <p:nvPr/>
-        </p:nvSpPr>
-        <p:spPr>
-          <a:xfrm>
-            <a:off x="457200" y="1371600"/>
-            <a:ext cx="11277295" cy="5029200"/>
-          </a:xfrm>
-          <a:prstGeom prst="roundRect">
-            <a:avLst/>
-          </a:prstGeom>
-          <a:solidFill>
-            <a:srgbClr val="28282D"/>
-          </a:solidFill>
-          <a:ln>
-            <a:noFill/>
-          </a:ln>
-        </p:spPr>
-        <p:style>
-          <a:lnRef idx="1">
-            <a:schemeClr val="accent1"/>
-          </a:lnRef>
-          <a:fillRef idx="3">
-            <a:schemeClr val="accent1"/>
-          </a:fillRef>
-          <a:effectRef idx="2">
-            <a:schemeClr val="accent1"/>
-          </a:effectRef>
-          <a:fontRef idx="minor">
-            <a:schemeClr val="lt1"/>
-          </a:fontRef>
-        </p:style>
-        <p:txBody>
-          <a:bodyPr rtlCol="0" anchor="ctr"/>
-          <a:lstStyle/>
-          <a:p>
-            <a:pPr algn="ctr"/>
-          </a:p>
-        </p:txBody>
-      </p:sp>
-      <p:sp>
-        <p:nvSpPr>
-          <p:cNvPr id="6" name="TextBox 5"/>
-          <p:cNvSpPr txBox="1"/>
-          <p:nvPr/>
-        </p:nvSpPr>
-        <p:spPr>
-          <a:xfrm>
-            <a:off x="914400" y="1828800"/>
-            <a:ext cx="10058400" cy="4114800"/>
-          </a:xfrm>
-          <a:prstGeom prst="rect">
-            <a:avLst/>
-          </a:prstGeom>
-          <a:noFill/>
-        </p:spPr>
-        <p:txBody>
-          <a:bodyPr wrap="square">
-            <a:spAutoFit/>
-          </a:bodyPr>
-          <a:lstStyle/>
-          <a:p>
-            <a:pPr>
-              <a:defRPr sz="1800" b="0">
-                <a:solidFill>
-                  <a:srgbClr val="C8C8C8"/>
-                </a:solidFill>
-                <a:latin typeface="Arial"/>
-              </a:defRPr>
-            </a:pPr>
-            <a:r>
-              <a:t>• Main point one with details</a:t>
-            </a:r>
-            <a:br/>
-            <a:r>
-              <a:t>• Main point two with supporting info</a:t>
-            </a:r>
-            <a:br/>
-            <a:r>
-              <a:t>• Main point three for emphasis</a:t>
-            </a:r>
-            <a:br/>
-            <a:r>
-              <a:t>• Conclusion and next steps</a:t>
+              <a:t>• Professional look</a:t>
             </a:r>
           </a:p>
         </p:txBody>

</xml_diff>

<commit_message>
fix: Recreate 10 truly unique Kimi-style sample templates
Each template now has completely different visual design:

1. Business Professional - Navy sidebar + bottom bar
2. Modern Dark - Dark bg + neon green circle + top bar
3. Minimalist - Pure white + subtle divider line
4. Nature Green - Green circles overlapping corners
5. Creative Purple - Purple left block + white circle
6. Sunset Orange - Orange bottom + yellow circle
7. Ocean Blue - Blue wave layers at bottom
8. Executive Gold - Gold top/bottom borders
9. Startup Modern - Purple right block + coral circle
10. Healthcare Medical - Teal sidebar + medical cross

All templates are visually distinct with unique:
- Color schemes
- Shape arrangements
- Layout compositions
- Design elements
</commit_message>
<xml_diff>
--- a/backend/templates/24a8c405-aed9-4e1f-8ce7-365303f19ea2.pptx
+++ b/backend/templates/24a8c405-aed9-4e1f-8ce7-365303f19ea2.pptx
@@ -3240,12 +3240,12 @@
           </a:bodyPr>
           <a:lstStyle/>
           <a:p>
-            <a:pPr>
+            <a:pPr algn="l">
               <a:defRPr sz="4800" b="1">
                 <a:solidFill>
                   <a:srgbClr val="FFFFFF"/>
                 </a:solidFill>
-                <a:latin typeface="Calibri"/>
+                <a:latin typeface="Arial"/>
               </a:defRPr>
             </a:pPr>
             <a:r>
@@ -3276,12 +3276,12 @@
           </a:bodyPr>
           <a:lstStyle/>
           <a:p>
-            <a:pPr>
+            <a:pPr algn="l">
               <a:defRPr sz="2000" b="0">
                 <a:solidFill>
                   <a:srgbClr val="B4B4B4"/>
                 </a:solidFill>
-                <a:latin typeface="Calibri"/>
+                <a:latin typeface="Arial"/>
               </a:defRPr>
             </a:pPr>
             <a:r>
@@ -3416,12 +3416,12 @@
           </a:bodyPr>
           <a:lstStyle/>
           <a:p>
-            <a:pPr>
+            <a:pPr algn="l">
               <a:defRPr sz="3200" b="1">
                 <a:solidFill>
                   <a:srgbClr val="00FFC8"/>
                 </a:solidFill>
-                <a:latin typeface="Calibri"/>
+                <a:latin typeface="Arial"/>
               </a:defRPr>
             </a:pPr>
             <a:r>
@@ -3495,12 +3495,12 @@
           </a:bodyPr>
           <a:lstStyle/>
           <a:p>
-            <a:pPr>
+            <a:pPr algn="l">
               <a:defRPr sz="2000" b="0">
                 <a:solidFill>
                   <a:srgbClr val="C8C8C8"/>
                 </a:solidFill>
-                <a:latin typeface="Calibri"/>
+                <a:latin typeface="Arial"/>
               </a:defRPr>
             </a:pPr>
             <a:r>

</xml_diff>